<commit_message>
Atualizando o arquivo de apresentação
</commit_message>
<xml_diff>
--- a/Data Science Using Python - Projeto 02.pptx
+++ b/Data Science Using Python - Projeto 02.pptx
@@ -327,7 +327,7 @@
             <a:fld id="{1D8BD707-D9CF-40AE-B4C6-C98DA3205C09}" type="datetimeFigureOut">
               <a:rPr lang="en-US" smtClean="0"/>
               <a:pPr/>
-              <a:t>9/1/2024</a:t>
+              <a:t>9/2/2024</a:t>
             </a:fld>
             <a:endParaRPr lang="en-US"/>
           </a:p>
@@ -492,7 +492,7 @@
             <a:fld id="{1D8BD707-D9CF-40AE-B4C6-C98DA3205C09}" type="datetimeFigureOut">
               <a:rPr lang="en-US" smtClean="0"/>
               <a:pPr/>
-              <a:t>9/1/2024</a:t>
+              <a:t>9/2/2024</a:t>
             </a:fld>
             <a:endParaRPr lang="en-US"/>
           </a:p>
@@ -667,7 +667,7 @@
             <a:fld id="{1D8BD707-D9CF-40AE-B4C6-C98DA3205C09}" type="datetimeFigureOut">
               <a:rPr lang="en-US" smtClean="0"/>
               <a:pPr/>
-              <a:t>9/1/2024</a:t>
+              <a:t>9/2/2024</a:t>
             </a:fld>
             <a:endParaRPr lang="en-US"/>
           </a:p>
@@ -832,7 +832,7 @@
             <a:fld id="{1D8BD707-D9CF-40AE-B4C6-C98DA3205C09}" type="datetimeFigureOut">
               <a:rPr lang="en-US" smtClean="0"/>
               <a:pPr/>
-              <a:t>9/1/2024</a:t>
+              <a:t>9/2/2024</a:t>
             </a:fld>
             <a:endParaRPr lang="en-US"/>
           </a:p>
@@ -1074,7 +1074,7 @@
             <a:fld id="{1D8BD707-D9CF-40AE-B4C6-C98DA3205C09}" type="datetimeFigureOut">
               <a:rPr lang="en-US" smtClean="0"/>
               <a:pPr/>
-              <a:t>9/1/2024</a:t>
+              <a:t>9/2/2024</a:t>
             </a:fld>
             <a:endParaRPr lang="en-US"/>
           </a:p>
@@ -1356,7 +1356,7 @@
             <a:fld id="{1D8BD707-D9CF-40AE-B4C6-C98DA3205C09}" type="datetimeFigureOut">
               <a:rPr lang="en-US" smtClean="0"/>
               <a:pPr/>
-              <a:t>9/1/2024</a:t>
+              <a:t>9/2/2024</a:t>
             </a:fld>
             <a:endParaRPr lang="en-US"/>
           </a:p>
@@ -1772,7 +1772,7 @@
             <a:fld id="{1D8BD707-D9CF-40AE-B4C6-C98DA3205C09}" type="datetimeFigureOut">
               <a:rPr lang="en-US" smtClean="0"/>
               <a:pPr/>
-              <a:t>9/1/2024</a:t>
+              <a:t>9/2/2024</a:t>
             </a:fld>
             <a:endParaRPr lang="en-US"/>
           </a:p>
@@ -1886,7 +1886,7 @@
             <a:fld id="{1D8BD707-D9CF-40AE-B4C6-C98DA3205C09}" type="datetimeFigureOut">
               <a:rPr lang="en-US" smtClean="0"/>
               <a:pPr/>
-              <a:t>9/1/2024</a:t>
+              <a:t>9/2/2024</a:t>
             </a:fld>
             <a:endParaRPr lang="en-US"/>
           </a:p>
@@ -1978,7 +1978,7 @@
             <a:fld id="{1D8BD707-D9CF-40AE-B4C6-C98DA3205C09}" type="datetimeFigureOut">
               <a:rPr lang="en-US" smtClean="0"/>
               <a:pPr/>
-              <a:t>9/1/2024</a:t>
+              <a:t>9/2/2024</a:t>
             </a:fld>
             <a:endParaRPr lang="en-US"/>
           </a:p>
@@ -2250,7 +2250,7 @@
             <a:fld id="{1D8BD707-D9CF-40AE-B4C6-C98DA3205C09}" type="datetimeFigureOut">
               <a:rPr lang="en-US" smtClean="0"/>
               <a:pPr/>
-              <a:t>9/1/2024</a:t>
+              <a:t>9/2/2024</a:t>
             </a:fld>
             <a:endParaRPr lang="en-US"/>
           </a:p>
@@ -2499,7 +2499,7 @@
             <a:fld id="{1D8BD707-D9CF-40AE-B4C6-C98DA3205C09}" type="datetimeFigureOut">
               <a:rPr lang="en-US" smtClean="0"/>
               <a:pPr/>
-              <a:t>9/1/2024</a:t>
+              <a:t>9/2/2024</a:t>
             </a:fld>
             <a:endParaRPr lang="en-US"/>
           </a:p>
@@ -2707,7 +2707,7 @@
             <a:fld id="{1D8BD707-D9CF-40AE-B4C6-C98DA3205C09}" type="datetimeFigureOut">
               <a:rPr lang="en-US" smtClean="0"/>
               <a:pPr/>
-              <a:t>9/1/2024</a:t>
+              <a:t>9/2/2024</a:t>
             </a:fld>
             <a:endParaRPr lang="en-US"/>
           </a:p>
@@ -3780,15 +3780,15 @@
         </p:nvSpPr>
         <p:spPr>
           <a:xfrm>
-            <a:off x="1356817" y="5982307"/>
-            <a:ext cx="4588714" cy="2082464"/>
+            <a:off x="1356816" y="5982307"/>
+            <a:ext cx="4729499" cy="2094997"/>
           </a:xfrm>
           <a:prstGeom prst="rect">
             <a:avLst/>
           </a:prstGeom>
         </p:spPr>
         <p:txBody>
-          <a:bodyPr lIns="0" tIns="0" rIns="0" bIns="0" rtlCol="0" anchor="t">
+          <a:bodyPr wrap="square" lIns="0" tIns="0" rIns="0" bIns="0" rtlCol="0" anchor="t">
             <a:spAutoFit/>
           </a:bodyPr>
           <a:lstStyle/>
@@ -3890,8 +3890,39 @@
                 <a:cs typeface="Jannah"/>
                 <a:sym typeface="Jannah"/>
               </a:rPr>
-              <a:t>LEONARDO DE SOUZA</a:t>
-            </a:r>
+              <a:t>LEONARDO DE SOUZA - </a:t>
+            </a:r>
+            <a:r>
+              <a:rPr lang="en-US" sz="2388" u="sng" dirty="0">
+                <a:solidFill>
+                  <a:schemeClr val="tx2">
+                    <a:lumMod val="20000"/>
+                    <a:lumOff val="80000"/>
+                  </a:schemeClr>
+                </a:solidFill>
+                <a:latin typeface="Jannah"/>
+                <a:cs typeface="Jannah"/>
+                <a:hlinkClick r:id="rId8">
+                  <a:extLst>
+                    <a:ext uri="{A12FA001-AC4F-418D-AE19-62706E023703}">
+                      <ahyp:hlinkClr xmlns:ahyp="http://schemas.microsoft.com/office/drawing/2018/hyperlinkcolor" val="tx"/>
+                    </a:ext>
+                  </a:extLst>
+                </a:hlinkClick>
+              </a:rPr>
+              <a:t>GITHUB</a:t>
+            </a:r>
+            <a:endParaRPr lang="en-US" sz="2388" u="sng" dirty="0">
+              <a:solidFill>
+                <a:schemeClr val="tx2">
+                  <a:lumMod val="20000"/>
+                  <a:lumOff val="80000"/>
+                </a:schemeClr>
+              </a:solidFill>
+              <a:latin typeface="Jannah"/>
+              <a:cs typeface="Jannah"/>
+              <a:sym typeface="Jannah"/>
+            </a:endParaRPr>
           </a:p>
           <a:p>
             <a:pPr algn="l">
@@ -3909,11 +3940,54 @@
                 <a:cs typeface="Jannah"/>
                 <a:sym typeface="Jannah"/>
               </a:rPr>
-              <a:t>MURILO SANTONE</a:t>
-            </a:r>
-          </a:p>
-          <a:p>
-            <a:pPr algn="l">
+              <a:t>MURILO SANTONE </a:t>
+            </a:r>
+            <a:r>
+              <a:rPr lang="en-US" sz="2388" dirty="0">
+                <a:solidFill>
+                  <a:srgbClr val="FFFFFF"/>
+                </a:solidFill>
+                <a:latin typeface="Jannah"/>
+                <a:cs typeface="Jannah"/>
+                <a:sym typeface="Jannah"/>
+              </a:rPr>
+              <a:t>- </a:t>
+            </a:r>
+            <a:r>
+              <a:rPr lang="en-US" sz="2388" u="sng" dirty="0">
+                <a:solidFill>
+                  <a:schemeClr val="tx2">
+                    <a:lumMod val="20000"/>
+                    <a:lumOff val="80000"/>
+                  </a:schemeClr>
+                </a:solidFill>
+                <a:latin typeface="Jannah"/>
+                <a:cs typeface="Jannah"/>
+                <a:sym typeface="Jannah"/>
+                <a:hlinkClick r:id="rId9">
+                  <a:extLst>
+                    <a:ext uri="{A12FA001-AC4F-418D-AE19-62706E023703}">
+                      <ahyp:hlinkClr xmlns:ahyp="http://schemas.microsoft.com/office/drawing/2018/hyperlinkcolor" val="tx"/>
+                    </a:ext>
+                  </a:extLst>
+                </a:hlinkClick>
+              </a:rPr>
+              <a:t>GITHUB</a:t>
+            </a:r>
+            <a:endParaRPr lang="en-US" sz="2388" u="sng" dirty="0">
+              <a:solidFill>
+                <a:schemeClr val="tx2">
+                  <a:lumMod val="20000"/>
+                  <a:lumOff val="80000"/>
+                </a:schemeClr>
+              </a:solidFill>
+              <a:latin typeface="Jannah"/>
+              <a:cs typeface="Jannah"/>
+              <a:sym typeface="Jannah"/>
+            </a:endParaRPr>
+          </a:p>
+          <a:p>
+            <a:pPr>
               <a:lnSpc>
                 <a:spcPts val="3343"/>
               </a:lnSpc>
@@ -3928,8 +4002,39 @@
                 <a:cs typeface="Jannah"/>
                 <a:sym typeface="Jannah"/>
               </a:rPr>
-              <a:t>RENATO GONÇALVES</a:t>
-            </a:r>
+              <a:t>RENATO GONÇALVES - </a:t>
+            </a:r>
+            <a:r>
+              <a:rPr lang="en-US" sz="2388" u="sng" dirty="0">
+                <a:solidFill>
+                  <a:schemeClr val="tx2">
+                    <a:lumMod val="20000"/>
+                    <a:lumOff val="80000"/>
+                  </a:schemeClr>
+                </a:solidFill>
+                <a:latin typeface="Jannah"/>
+                <a:cs typeface="Jannah"/>
+                <a:hlinkClick r:id="rId10">
+                  <a:extLst>
+                    <a:ext uri="{A12FA001-AC4F-418D-AE19-62706E023703}">
+                      <ahyp:hlinkClr xmlns:ahyp="http://schemas.microsoft.com/office/drawing/2018/hyperlinkcolor" val="tx"/>
+                    </a:ext>
+                  </a:extLst>
+                </a:hlinkClick>
+              </a:rPr>
+              <a:t>GITHUB</a:t>
+            </a:r>
+            <a:endParaRPr lang="en-US" sz="2388" u="sng" dirty="0">
+              <a:solidFill>
+                <a:schemeClr val="tx2">
+                  <a:lumMod val="20000"/>
+                  <a:lumOff val="80000"/>
+                </a:schemeClr>
+              </a:solidFill>
+              <a:latin typeface="Jannah"/>
+              <a:cs typeface="Jannah"/>
+              <a:sym typeface="Jannah"/>
+            </a:endParaRPr>
           </a:p>
         </p:txBody>
       </p:sp>
@@ -4994,16 +5099,304 @@
               </a:lnSpc>
             </a:pPr>
             <a:r>
-              <a:rPr lang="en-US" sz="3100">
-                <a:solidFill>
-                  <a:srgbClr val="545454"/>
-                </a:solidFill>
-                <a:latin typeface="Jannah"/>
-                <a:ea typeface="Jannah"/>
-                <a:cs typeface="Jannah"/>
-                <a:sym typeface="Jannah"/>
-              </a:rPr>
-              <a:t>1.Podem ser tomadas medidas para melhor lidar com um fluxo maior ou uma demanda maior, como o uso de mais aviões.</a:t>
+              <a:rPr lang="en-US" sz="3100" dirty="0">
+                <a:solidFill>
+                  <a:srgbClr val="545454"/>
+                </a:solidFill>
+                <a:latin typeface="Jannah"/>
+                <a:ea typeface="Jannah"/>
+                <a:cs typeface="Jannah"/>
+                <a:sym typeface="Jannah"/>
+              </a:rPr>
+              <a:t>1.Podem ser </a:t>
+            </a:r>
+            <a:r>
+              <a:rPr lang="en-US" sz="3100" dirty="0" err="1">
+                <a:solidFill>
+                  <a:srgbClr val="545454"/>
+                </a:solidFill>
+                <a:latin typeface="Jannah"/>
+                <a:ea typeface="Jannah"/>
+                <a:cs typeface="Jannah"/>
+                <a:sym typeface="Jannah"/>
+              </a:rPr>
+              <a:t>tomadas</a:t>
+            </a:r>
+            <a:r>
+              <a:rPr lang="en-US" sz="3100" dirty="0">
+                <a:solidFill>
+                  <a:srgbClr val="545454"/>
+                </a:solidFill>
+                <a:latin typeface="Jannah"/>
+                <a:ea typeface="Jannah"/>
+                <a:cs typeface="Jannah"/>
+                <a:sym typeface="Jannah"/>
+              </a:rPr>
+              <a:t> </a:t>
+            </a:r>
+            <a:r>
+              <a:rPr lang="en-US" sz="3100" dirty="0" err="1">
+                <a:solidFill>
+                  <a:srgbClr val="545454"/>
+                </a:solidFill>
+                <a:latin typeface="Jannah"/>
+                <a:ea typeface="Jannah"/>
+                <a:cs typeface="Jannah"/>
+                <a:sym typeface="Jannah"/>
+              </a:rPr>
+              <a:t>medidas</a:t>
+            </a:r>
+            <a:r>
+              <a:rPr lang="en-US" sz="3100" dirty="0">
+                <a:solidFill>
+                  <a:srgbClr val="545454"/>
+                </a:solidFill>
+                <a:latin typeface="Jannah"/>
+                <a:ea typeface="Jannah"/>
+                <a:cs typeface="Jannah"/>
+                <a:sym typeface="Jannah"/>
+              </a:rPr>
+              <a:t> para </a:t>
+            </a:r>
+            <a:r>
+              <a:rPr lang="en-US" sz="3100" dirty="0" err="1">
+                <a:solidFill>
+                  <a:srgbClr val="545454"/>
+                </a:solidFill>
+                <a:latin typeface="Jannah"/>
+                <a:ea typeface="Jannah"/>
+                <a:cs typeface="Jannah"/>
+                <a:sym typeface="Jannah"/>
+              </a:rPr>
+              <a:t>melhor</a:t>
+            </a:r>
+            <a:r>
+              <a:rPr lang="en-US" sz="3100" dirty="0">
+                <a:solidFill>
+                  <a:srgbClr val="545454"/>
+                </a:solidFill>
+                <a:latin typeface="Jannah"/>
+                <a:ea typeface="Jannah"/>
+                <a:cs typeface="Jannah"/>
+                <a:sym typeface="Jannah"/>
+              </a:rPr>
+              <a:t> lidar com um </a:t>
+            </a:r>
+            <a:r>
+              <a:rPr lang="en-US" sz="3100" dirty="0" err="1">
+                <a:solidFill>
+                  <a:srgbClr val="545454"/>
+                </a:solidFill>
+                <a:latin typeface="Jannah"/>
+                <a:ea typeface="Jannah"/>
+                <a:cs typeface="Jannah"/>
+                <a:sym typeface="Jannah"/>
+              </a:rPr>
+              <a:t>fluxo</a:t>
+            </a:r>
+            <a:r>
+              <a:rPr lang="en-US" sz="3100" dirty="0">
+                <a:solidFill>
+                  <a:srgbClr val="545454"/>
+                </a:solidFill>
+                <a:latin typeface="Jannah"/>
+                <a:ea typeface="Jannah"/>
+                <a:cs typeface="Jannah"/>
+                <a:sym typeface="Jannah"/>
+              </a:rPr>
+              <a:t> </a:t>
+            </a:r>
+            <a:r>
+              <a:rPr lang="en-US" sz="3100" dirty="0" err="1">
+                <a:solidFill>
+                  <a:srgbClr val="545454"/>
+                </a:solidFill>
+                <a:latin typeface="Jannah"/>
+                <a:ea typeface="Jannah"/>
+                <a:cs typeface="Jannah"/>
+                <a:sym typeface="Jannah"/>
+              </a:rPr>
+              <a:t>maior</a:t>
+            </a:r>
+            <a:r>
+              <a:rPr lang="en-US" sz="3100" dirty="0">
+                <a:solidFill>
+                  <a:srgbClr val="545454"/>
+                </a:solidFill>
+                <a:latin typeface="Jannah"/>
+                <a:ea typeface="Jannah"/>
+                <a:cs typeface="Jannah"/>
+                <a:sym typeface="Jannah"/>
+              </a:rPr>
+              <a:t> </a:t>
+            </a:r>
+            <a:r>
+              <a:rPr lang="en-US" sz="3100" dirty="0" err="1">
+                <a:solidFill>
+                  <a:srgbClr val="545454"/>
+                </a:solidFill>
+                <a:latin typeface="Jannah"/>
+                <a:ea typeface="Jannah"/>
+                <a:cs typeface="Jannah"/>
+                <a:sym typeface="Jannah"/>
+              </a:rPr>
+              <a:t>ou</a:t>
+            </a:r>
+            <a:r>
+              <a:rPr lang="en-US" sz="3100" dirty="0">
+                <a:solidFill>
+                  <a:srgbClr val="545454"/>
+                </a:solidFill>
+                <a:latin typeface="Jannah"/>
+                <a:ea typeface="Jannah"/>
+                <a:cs typeface="Jannah"/>
+                <a:sym typeface="Jannah"/>
+              </a:rPr>
+              <a:t> </a:t>
+            </a:r>
+            <a:r>
+              <a:rPr lang="en-US" sz="3100" dirty="0" err="1">
+                <a:solidFill>
+                  <a:srgbClr val="545454"/>
+                </a:solidFill>
+                <a:latin typeface="Jannah"/>
+                <a:ea typeface="Jannah"/>
+                <a:cs typeface="Jannah"/>
+                <a:sym typeface="Jannah"/>
+              </a:rPr>
+              <a:t>demanda</a:t>
+            </a:r>
+            <a:r>
+              <a:rPr lang="en-US" sz="3100" dirty="0">
+                <a:solidFill>
+                  <a:srgbClr val="545454"/>
+                </a:solidFill>
+                <a:latin typeface="Jannah"/>
+                <a:ea typeface="Jannah"/>
+                <a:cs typeface="Jannah"/>
+                <a:sym typeface="Jannah"/>
+              </a:rPr>
+              <a:t> </a:t>
+            </a:r>
+            <a:r>
+              <a:rPr lang="en-US" sz="3100" dirty="0" err="1">
+                <a:solidFill>
+                  <a:srgbClr val="545454"/>
+                </a:solidFill>
+                <a:latin typeface="Jannah"/>
+                <a:ea typeface="Jannah"/>
+                <a:cs typeface="Jannah"/>
+                <a:sym typeface="Jannah"/>
+              </a:rPr>
+              <a:t>maior</a:t>
+            </a:r>
+            <a:r>
+              <a:rPr lang="en-US" sz="3100" dirty="0">
+                <a:solidFill>
+                  <a:srgbClr val="545454"/>
+                </a:solidFill>
+                <a:latin typeface="Jannah"/>
+                <a:ea typeface="Jannah"/>
+                <a:cs typeface="Jannah"/>
+                <a:sym typeface="Jannah"/>
+              </a:rPr>
+              <a:t>, </a:t>
+            </a:r>
+            <a:r>
+              <a:rPr lang="en-US" sz="3100" dirty="0" err="1">
+                <a:solidFill>
+                  <a:srgbClr val="545454"/>
+                </a:solidFill>
+                <a:latin typeface="Jannah"/>
+                <a:ea typeface="Jannah"/>
+                <a:cs typeface="Jannah"/>
+                <a:sym typeface="Jannah"/>
+              </a:rPr>
+              <a:t>como</a:t>
+            </a:r>
+            <a:r>
+              <a:rPr lang="en-US" sz="3100" dirty="0">
+                <a:solidFill>
+                  <a:srgbClr val="545454"/>
+                </a:solidFill>
+                <a:latin typeface="Jannah"/>
+                <a:ea typeface="Jannah"/>
+                <a:cs typeface="Jannah"/>
+                <a:sym typeface="Jannah"/>
+              </a:rPr>
+              <a:t> o </a:t>
+            </a:r>
+            <a:r>
+              <a:rPr lang="en-US" sz="3100" dirty="0" err="1">
+                <a:solidFill>
+                  <a:srgbClr val="545454"/>
+                </a:solidFill>
+                <a:latin typeface="Jannah"/>
+                <a:ea typeface="Jannah"/>
+                <a:cs typeface="Jannah"/>
+                <a:sym typeface="Jannah"/>
+              </a:rPr>
+              <a:t>uso</a:t>
+            </a:r>
+            <a:r>
+              <a:rPr lang="en-US" sz="3100" dirty="0">
+                <a:solidFill>
+                  <a:srgbClr val="545454"/>
+                </a:solidFill>
+                <a:latin typeface="Jannah"/>
+                <a:ea typeface="Jannah"/>
+                <a:cs typeface="Jannah"/>
+                <a:sym typeface="Jannah"/>
+              </a:rPr>
+              <a:t> de </a:t>
+            </a:r>
+            <a:r>
+              <a:rPr lang="en-US" sz="3100" dirty="0" err="1">
+                <a:solidFill>
+                  <a:srgbClr val="545454"/>
+                </a:solidFill>
+                <a:latin typeface="Jannah"/>
+                <a:ea typeface="Jannah"/>
+                <a:cs typeface="Jannah"/>
+                <a:sym typeface="Jannah"/>
+              </a:rPr>
+              <a:t>mais</a:t>
+            </a:r>
+            <a:r>
+              <a:rPr lang="en-US" sz="3100" dirty="0">
+                <a:solidFill>
+                  <a:srgbClr val="545454"/>
+                </a:solidFill>
+                <a:latin typeface="Jannah"/>
+                <a:ea typeface="Jannah"/>
+                <a:cs typeface="Jannah"/>
+                <a:sym typeface="Jannah"/>
+              </a:rPr>
+              <a:t> </a:t>
+            </a:r>
+            <a:r>
+              <a:rPr lang="en-US" sz="3100" dirty="0" err="1">
+                <a:solidFill>
+                  <a:srgbClr val="545454"/>
+                </a:solidFill>
+                <a:latin typeface="Jannah"/>
+                <a:ea typeface="Jannah"/>
+                <a:cs typeface="Jannah"/>
+                <a:sym typeface="Jannah"/>
+              </a:rPr>
+              <a:t>aviões</a:t>
+            </a:r>
+            <a:r>
+              <a:rPr lang="en-US" sz="3100" dirty="0">
+                <a:solidFill>
+                  <a:srgbClr val="545454"/>
+                </a:solidFill>
+                <a:latin typeface="Jannah"/>
+                <a:ea typeface="Jannah"/>
+                <a:cs typeface="Jannah"/>
+                <a:sym typeface="Jannah"/>
+              </a:rPr>
+              <a:t>.</a:t>
             </a:r>
           </a:p>
         </p:txBody>
@@ -6680,16 +7073,220 @@
               </a:lnSpc>
             </a:pPr>
             <a:r>
-              <a:rPr lang="en-US" sz="2400">
-                <a:solidFill>
-                  <a:srgbClr val="545454"/>
-                </a:solidFill>
-                <a:latin typeface="Jannah"/>
-                <a:ea typeface="Jannah"/>
-                <a:cs typeface="Jannah"/>
-                <a:sym typeface="Jannah"/>
-              </a:rPr>
-              <a:t>Classificamos em três grupos: Baixo Atraso, Médio Atraso e Alto Atraso.</a:t>
+              <a:rPr lang="en-US" sz="2400" dirty="0" err="1">
+                <a:solidFill>
+                  <a:srgbClr val="545454"/>
+                </a:solidFill>
+                <a:latin typeface="Jannah"/>
+                <a:ea typeface="Jannah"/>
+                <a:cs typeface="Jannah"/>
+                <a:sym typeface="Jannah"/>
+              </a:rPr>
+              <a:t>Classificamos</a:t>
+            </a:r>
+            <a:r>
+              <a:rPr lang="en-US" sz="2400" dirty="0">
+                <a:solidFill>
+                  <a:srgbClr val="545454"/>
+                </a:solidFill>
+                <a:latin typeface="Jannah"/>
+                <a:ea typeface="Jannah"/>
+                <a:cs typeface="Jannah"/>
+                <a:sym typeface="Jannah"/>
+              </a:rPr>
+              <a:t> </a:t>
+            </a:r>
+            <a:r>
+              <a:rPr lang="en-US" sz="2400" dirty="0" err="1">
+                <a:solidFill>
+                  <a:srgbClr val="545454"/>
+                </a:solidFill>
+                <a:latin typeface="Jannah"/>
+                <a:ea typeface="Jannah"/>
+                <a:cs typeface="Jannah"/>
+                <a:sym typeface="Jannah"/>
+              </a:rPr>
+              <a:t>em</a:t>
+            </a:r>
+            <a:r>
+              <a:rPr lang="en-US" sz="2400" dirty="0">
+                <a:solidFill>
+                  <a:srgbClr val="545454"/>
+                </a:solidFill>
+                <a:latin typeface="Jannah"/>
+                <a:ea typeface="Jannah"/>
+                <a:cs typeface="Jannah"/>
+                <a:sym typeface="Jannah"/>
+              </a:rPr>
+              <a:t> </a:t>
+            </a:r>
+            <a:r>
+              <a:rPr lang="en-US" sz="2400" dirty="0" err="1">
+                <a:solidFill>
+                  <a:srgbClr val="545454"/>
+                </a:solidFill>
+                <a:latin typeface="Jannah"/>
+                <a:ea typeface="Jannah"/>
+                <a:cs typeface="Jannah"/>
+                <a:sym typeface="Jannah"/>
+              </a:rPr>
+              <a:t>três</a:t>
+            </a:r>
+            <a:r>
+              <a:rPr lang="en-US" sz="2400" dirty="0">
+                <a:solidFill>
+                  <a:srgbClr val="545454"/>
+                </a:solidFill>
+                <a:latin typeface="Jannah"/>
+                <a:ea typeface="Jannah"/>
+                <a:cs typeface="Jannah"/>
+                <a:sym typeface="Jannah"/>
+              </a:rPr>
+              <a:t> </a:t>
+            </a:r>
+            <a:r>
+              <a:rPr lang="en-US" sz="2400" dirty="0" err="1">
+                <a:solidFill>
+                  <a:srgbClr val="545454"/>
+                </a:solidFill>
+                <a:latin typeface="Jannah"/>
+                <a:ea typeface="Jannah"/>
+                <a:cs typeface="Jannah"/>
+                <a:sym typeface="Jannah"/>
+              </a:rPr>
+              <a:t>grupos</a:t>
+            </a:r>
+            <a:r>
+              <a:rPr lang="en-US" sz="2400" dirty="0">
+                <a:solidFill>
+                  <a:srgbClr val="545454"/>
+                </a:solidFill>
+                <a:latin typeface="Jannah"/>
+                <a:ea typeface="Jannah"/>
+                <a:cs typeface="Jannah"/>
+                <a:sym typeface="Jannah"/>
+              </a:rPr>
+              <a:t>: </a:t>
+            </a:r>
+            <a:r>
+              <a:rPr lang="en-US" sz="2400" dirty="0" err="1">
+                <a:solidFill>
+                  <a:srgbClr val="545454"/>
+                </a:solidFill>
+                <a:latin typeface="Jannah"/>
+                <a:ea typeface="Jannah"/>
+                <a:cs typeface="Jannah"/>
+                <a:sym typeface="Jannah"/>
+              </a:rPr>
+              <a:t>Baixo</a:t>
+            </a:r>
+            <a:r>
+              <a:rPr lang="en-US" sz="2400" dirty="0">
+                <a:solidFill>
+                  <a:srgbClr val="545454"/>
+                </a:solidFill>
+                <a:latin typeface="Jannah"/>
+                <a:ea typeface="Jannah"/>
+                <a:cs typeface="Jannah"/>
+                <a:sym typeface="Jannah"/>
+              </a:rPr>
+              <a:t> </a:t>
+            </a:r>
+            <a:r>
+              <a:rPr lang="en-US" sz="2400" dirty="0" err="1">
+                <a:solidFill>
+                  <a:srgbClr val="545454"/>
+                </a:solidFill>
+                <a:latin typeface="Jannah"/>
+                <a:ea typeface="Jannah"/>
+                <a:cs typeface="Jannah"/>
+                <a:sym typeface="Jannah"/>
+              </a:rPr>
+              <a:t>Atraso</a:t>
+            </a:r>
+            <a:r>
+              <a:rPr lang="en-US" sz="2400" dirty="0">
+                <a:solidFill>
+                  <a:srgbClr val="545454"/>
+                </a:solidFill>
+                <a:latin typeface="Jannah"/>
+                <a:ea typeface="Jannah"/>
+                <a:cs typeface="Jannah"/>
+                <a:sym typeface="Jannah"/>
+              </a:rPr>
+              <a:t>, </a:t>
+            </a:r>
+            <a:r>
+              <a:rPr lang="en-US" sz="2400" dirty="0" err="1">
+                <a:solidFill>
+                  <a:srgbClr val="545454"/>
+                </a:solidFill>
+                <a:latin typeface="Jannah"/>
+                <a:ea typeface="Jannah"/>
+                <a:cs typeface="Jannah"/>
+                <a:sym typeface="Jannah"/>
+              </a:rPr>
+              <a:t>Médio</a:t>
+            </a:r>
+            <a:r>
+              <a:rPr lang="en-US" sz="2400" dirty="0">
+                <a:solidFill>
+                  <a:srgbClr val="545454"/>
+                </a:solidFill>
+                <a:latin typeface="Jannah"/>
+                <a:ea typeface="Jannah"/>
+                <a:cs typeface="Jannah"/>
+                <a:sym typeface="Jannah"/>
+              </a:rPr>
+              <a:t> </a:t>
+            </a:r>
+            <a:r>
+              <a:rPr lang="en-US" sz="2400" dirty="0" err="1">
+                <a:solidFill>
+                  <a:srgbClr val="545454"/>
+                </a:solidFill>
+                <a:latin typeface="Jannah"/>
+                <a:ea typeface="Jannah"/>
+                <a:cs typeface="Jannah"/>
+                <a:sym typeface="Jannah"/>
+              </a:rPr>
+              <a:t>Atraso</a:t>
+            </a:r>
+            <a:r>
+              <a:rPr lang="en-US" sz="2400" dirty="0">
+                <a:solidFill>
+                  <a:srgbClr val="545454"/>
+                </a:solidFill>
+                <a:latin typeface="Jannah"/>
+                <a:ea typeface="Jannah"/>
+                <a:cs typeface="Jannah"/>
+                <a:sym typeface="Jannah"/>
+              </a:rPr>
+              <a:t> e Alto </a:t>
+            </a:r>
+            <a:r>
+              <a:rPr lang="en-US" sz="2400" dirty="0" err="1">
+                <a:solidFill>
+                  <a:srgbClr val="545454"/>
+                </a:solidFill>
+                <a:latin typeface="Jannah"/>
+                <a:ea typeface="Jannah"/>
+                <a:cs typeface="Jannah"/>
+                <a:sym typeface="Jannah"/>
+              </a:rPr>
+              <a:t>Atraso</a:t>
+            </a:r>
+            <a:r>
+              <a:rPr lang="en-US" sz="2400" dirty="0">
+                <a:solidFill>
+                  <a:srgbClr val="545454"/>
+                </a:solidFill>
+                <a:latin typeface="Jannah"/>
+                <a:ea typeface="Jannah"/>
+                <a:cs typeface="Jannah"/>
+                <a:sym typeface="Jannah"/>
+              </a:rPr>
+              <a:t>.</a:t>
             </a:r>
           </a:p>
         </p:txBody>
@@ -7680,6 +8277,243 @@
               </a:lnSpc>
             </a:pPr>
             <a:r>
+              <a:rPr lang="en-US" sz="2400" dirty="0" err="1">
+                <a:solidFill>
+                  <a:srgbClr val="545454"/>
+                </a:solidFill>
+                <a:latin typeface="Jannah"/>
+                <a:ea typeface="Jannah"/>
+                <a:cs typeface="Jannah"/>
+                <a:sym typeface="Jannah"/>
+              </a:rPr>
+              <a:t>Existem</a:t>
+            </a:r>
+            <a:r>
+              <a:rPr lang="en-US" sz="2400" dirty="0">
+                <a:solidFill>
+                  <a:srgbClr val="545454"/>
+                </a:solidFill>
+                <a:latin typeface="Jannah"/>
+                <a:ea typeface="Jannah"/>
+                <a:cs typeface="Jannah"/>
+                <a:sym typeface="Jannah"/>
+              </a:rPr>
+              <a:t> 16 </a:t>
+            </a:r>
+            <a:r>
+              <a:rPr lang="en-US" sz="2400" dirty="0" err="1">
+                <a:solidFill>
+                  <a:srgbClr val="545454"/>
+                </a:solidFill>
+                <a:latin typeface="Jannah"/>
+                <a:ea typeface="Jannah"/>
+                <a:cs typeface="Jannah"/>
+                <a:sym typeface="Jannah"/>
+              </a:rPr>
+              <a:t>empresas</a:t>
+            </a:r>
+            <a:r>
+              <a:rPr lang="en-US" sz="2400" dirty="0">
+                <a:solidFill>
+                  <a:srgbClr val="545454"/>
+                </a:solidFill>
+                <a:latin typeface="Jannah"/>
+                <a:ea typeface="Jannah"/>
+                <a:cs typeface="Jannah"/>
+                <a:sym typeface="Jannah"/>
+              </a:rPr>
+              <a:t> </a:t>
+            </a:r>
+            <a:r>
+              <a:rPr lang="en-US" sz="2400" dirty="0" err="1">
+                <a:solidFill>
+                  <a:srgbClr val="545454"/>
+                </a:solidFill>
+                <a:latin typeface="Jannah"/>
+                <a:ea typeface="Jannah"/>
+                <a:cs typeface="Jannah"/>
+                <a:sym typeface="Jannah"/>
+              </a:rPr>
+              <a:t>na</a:t>
+            </a:r>
+            <a:r>
+              <a:rPr lang="en-US" sz="2400" dirty="0">
+                <a:solidFill>
+                  <a:srgbClr val="545454"/>
+                </a:solidFill>
+                <a:latin typeface="Jannah"/>
+                <a:ea typeface="Jannah"/>
+                <a:cs typeface="Jannah"/>
+                <a:sym typeface="Jannah"/>
+              </a:rPr>
+              <a:t> base de dados e </a:t>
+            </a:r>
+            <a:r>
+              <a:rPr lang="en-US" sz="2400" dirty="0" err="1">
+                <a:solidFill>
+                  <a:srgbClr val="545454"/>
+                </a:solidFill>
+                <a:latin typeface="Jannah"/>
+                <a:ea typeface="Jannah"/>
+                <a:cs typeface="Jannah"/>
+                <a:sym typeface="Jannah"/>
+              </a:rPr>
+              <a:t>classificamos</a:t>
+            </a:r>
+            <a:r>
+              <a:rPr lang="en-US" sz="2400" dirty="0">
+                <a:solidFill>
+                  <a:srgbClr val="545454"/>
+                </a:solidFill>
+                <a:latin typeface="Jannah"/>
+                <a:ea typeface="Jannah"/>
+                <a:cs typeface="Jannah"/>
+                <a:sym typeface="Jannah"/>
+              </a:rPr>
+              <a:t> as que </a:t>
+            </a:r>
+            <a:r>
+              <a:rPr lang="en-US" sz="2400" dirty="0" err="1">
+                <a:solidFill>
+                  <a:srgbClr val="545454"/>
+                </a:solidFill>
+                <a:latin typeface="Jannah"/>
+                <a:ea typeface="Jannah"/>
+                <a:cs typeface="Jannah"/>
+                <a:sym typeface="Jannah"/>
+              </a:rPr>
+              <a:t>mais</a:t>
+            </a:r>
+            <a:r>
+              <a:rPr lang="en-US" sz="2400" dirty="0">
+                <a:solidFill>
+                  <a:srgbClr val="545454"/>
+                </a:solidFill>
+                <a:latin typeface="Jannah"/>
+                <a:ea typeface="Jannah"/>
+                <a:cs typeface="Jannah"/>
+                <a:sym typeface="Jannah"/>
+              </a:rPr>
+              <a:t> se </a:t>
+            </a:r>
+            <a:r>
+              <a:rPr lang="en-US" sz="2400" dirty="0" err="1">
+                <a:solidFill>
+                  <a:srgbClr val="545454"/>
+                </a:solidFill>
+                <a:latin typeface="Jannah"/>
+                <a:ea typeface="Jannah"/>
+                <a:cs typeface="Jannah"/>
+                <a:sym typeface="Jannah"/>
+              </a:rPr>
+              <a:t>atrasam</a:t>
+            </a:r>
+            <a:r>
+              <a:rPr lang="en-US" sz="2400" dirty="0">
+                <a:solidFill>
+                  <a:srgbClr val="545454"/>
+                </a:solidFill>
+                <a:latin typeface="Jannah"/>
+                <a:ea typeface="Jannah"/>
+                <a:cs typeface="Jannah"/>
+                <a:sym typeface="Jannah"/>
+              </a:rPr>
+              <a:t> para as que </a:t>
+            </a:r>
+            <a:r>
+              <a:rPr lang="en-US" sz="2400" dirty="0" err="1">
+                <a:solidFill>
+                  <a:srgbClr val="545454"/>
+                </a:solidFill>
+                <a:latin typeface="Jannah"/>
+                <a:ea typeface="Jannah"/>
+                <a:cs typeface="Jannah"/>
+                <a:sym typeface="Jannah"/>
+              </a:rPr>
+              <a:t>menos</a:t>
+            </a:r>
+            <a:r>
+              <a:rPr lang="en-US" sz="2400" dirty="0">
+                <a:solidFill>
+                  <a:srgbClr val="545454"/>
+                </a:solidFill>
+                <a:latin typeface="Jannah"/>
+                <a:ea typeface="Jannah"/>
+                <a:cs typeface="Jannah"/>
+                <a:sym typeface="Jannah"/>
+              </a:rPr>
+              <a:t> se </a:t>
+            </a:r>
+            <a:r>
+              <a:rPr lang="en-US" sz="2400" dirty="0" err="1">
+                <a:solidFill>
+                  <a:srgbClr val="545454"/>
+                </a:solidFill>
+                <a:latin typeface="Jannah"/>
+                <a:ea typeface="Jannah"/>
+                <a:cs typeface="Jannah"/>
+                <a:sym typeface="Jannah"/>
+              </a:rPr>
+              <a:t>atrasam</a:t>
+            </a:r>
+            <a:r>
+              <a:rPr lang="en-US" sz="2400" dirty="0">
+                <a:solidFill>
+                  <a:srgbClr val="545454"/>
+                </a:solidFill>
+                <a:latin typeface="Jannah"/>
+                <a:ea typeface="Jannah"/>
+                <a:cs typeface="Jannah"/>
+                <a:sym typeface="Jannah"/>
+              </a:rPr>
+              <a:t>:</a:t>
+            </a:r>
+          </a:p>
+          <a:p>
+            <a:pPr algn="l">
+              <a:lnSpc>
+                <a:spcPts val="3120"/>
+              </a:lnSpc>
+            </a:pPr>
+            <a:endParaRPr lang="en-US" sz="2400" dirty="0">
+              <a:solidFill>
+                <a:srgbClr val="545454"/>
+              </a:solidFill>
+              <a:latin typeface="Jannah"/>
+              <a:ea typeface="Jannah"/>
+              <a:cs typeface="Jannah"/>
+              <a:sym typeface="Jannah"/>
+            </a:endParaRPr>
+          </a:p>
+        </p:txBody>
+      </p:sp>
+      <p:sp>
+        <p:nvSpPr>
+          <p:cNvPr id="28" name="TextBox 28"/>
+          <p:cNvSpPr txBox="1"/>
+          <p:nvPr/>
+        </p:nvSpPr>
+        <p:spPr>
+          <a:xfrm>
+            <a:off x="11107522" y="7590927"/>
+            <a:ext cx="6750838" cy="1169670"/>
+          </a:xfrm>
+          <a:prstGeom prst="rect">
+            <a:avLst/>
+          </a:prstGeom>
+        </p:spPr>
+        <p:txBody>
+          <a:bodyPr lIns="0" tIns="0" rIns="0" bIns="0" rtlCol="0" anchor="t">
+            <a:spAutoFit/>
+          </a:bodyPr>
+          <a:lstStyle/>
+          <a:p>
+            <a:pPr algn="l">
+              <a:lnSpc>
+                <a:spcPts val="3120"/>
+              </a:lnSpc>
+            </a:pPr>
+            <a:r>
               <a:rPr lang="en-US" sz="2400">
                 <a:solidFill>
                   <a:srgbClr val="545454"/>
@@ -7689,7 +8523,7 @@
                 <a:cs typeface="Jannah"/>
                 <a:sym typeface="Jannah"/>
               </a:rPr>
-              <a:t>Existem 16 empresas na base de dados e classificamos as que mais se atrasam para as que menos se atrasam:</a:t>
+              <a:t>F9, FL, EV, YV, OO, MQ, WN, B6, 9E, B6, UA, US, VX, DL, AA, HA, AS </a:t>
             </a:r>
           </a:p>
           <a:p>
@@ -7712,14 +8546,178 @@
       </p:sp>
       <p:sp>
         <p:nvSpPr>
-          <p:cNvPr id="28" name="TextBox 28"/>
+          <p:cNvPr id="29" name="TextBox 29"/>
           <p:cNvSpPr txBox="1"/>
           <p:nvPr/>
         </p:nvSpPr>
         <p:spPr>
           <a:xfrm>
-            <a:off x="11107522" y="7590927"/>
-            <a:ext cx="6750838" cy="1169670"/>
+            <a:off x="11107522" y="5236100"/>
+            <a:ext cx="1987299" cy="290871"/>
+          </a:xfrm>
+          <a:prstGeom prst="rect">
+            <a:avLst/>
+          </a:prstGeom>
+        </p:spPr>
+        <p:txBody>
+          <a:bodyPr lIns="0" tIns="0" rIns="0" bIns="0" rtlCol="0" anchor="t">
+            <a:spAutoFit/>
+          </a:bodyPr>
+          <a:lstStyle/>
+          <a:p>
+            <a:pPr algn="l">
+              <a:lnSpc>
+                <a:spcPts val="2339"/>
+              </a:lnSpc>
+            </a:pPr>
+            <a:r>
+              <a:rPr lang="en-US" sz="1799">
+                <a:solidFill>
+                  <a:srgbClr val="FFFFFF"/>
+                </a:solidFill>
+                <a:latin typeface="Jannah"/>
+                <a:ea typeface="Jannah"/>
+                <a:cs typeface="Jannah"/>
+                <a:sym typeface="Jannah"/>
+              </a:rPr>
+              <a:t>QUANTAS?</a:t>
+            </a:r>
+          </a:p>
+        </p:txBody>
+      </p:sp>
+      <p:sp>
+        <p:nvSpPr>
+          <p:cNvPr id="30" name="TextBox 30"/>
+          <p:cNvSpPr txBox="1"/>
+          <p:nvPr/>
+        </p:nvSpPr>
+        <p:spPr>
+          <a:xfrm>
+            <a:off x="11107522" y="7149197"/>
+            <a:ext cx="1987299" cy="290871"/>
+          </a:xfrm>
+          <a:prstGeom prst="rect">
+            <a:avLst/>
+          </a:prstGeom>
+        </p:spPr>
+        <p:txBody>
+          <a:bodyPr lIns="0" tIns="0" rIns="0" bIns="0" rtlCol="0" anchor="t">
+            <a:spAutoFit/>
+          </a:bodyPr>
+          <a:lstStyle/>
+          <a:p>
+            <a:pPr algn="l">
+              <a:lnSpc>
+                <a:spcPts val="2339"/>
+              </a:lnSpc>
+            </a:pPr>
+            <a:r>
+              <a:rPr lang="en-US" sz="1799">
+                <a:solidFill>
+                  <a:srgbClr val="FFFFFF"/>
+                </a:solidFill>
+                <a:latin typeface="Jannah"/>
+                <a:ea typeface="Jannah"/>
+                <a:cs typeface="Jannah"/>
+                <a:sym typeface="Jannah"/>
+              </a:rPr>
+              <a:t>QUAIS?</a:t>
+            </a:r>
+          </a:p>
+        </p:txBody>
+      </p:sp>
+      <p:sp>
+        <p:nvSpPr>
+          <p:cNvPr id="31" name="TextBox 31"/>
+          <p:cNvSpPr txBox="1"/>
+          <p:nvPr/>
+        </p:nvSpPr>
+        <p:spPr>
+          <a:xfrm>
+            <a:off x="114500" y="-9312"/>
+            <a:ext cx="9211142" cy="920316"/>
+          </a:xfrm>
+          <a:prstGeom prst="rect">
+            <a:avLst/>
+          </a:prstGeom>
+        </p:spPr>
+        <p:txBody>
+          <a:bodyPr lIns="0" tIns="0" rIns="0" bIns="0" rtlCol="0" anchor="t">
+            <a:spAutoFit/>
+          </a:bodyPr>
+          <a:lstStyle/>
+          <a:p>
+            <a:pPr algn="just">
+              <a:lnSpc>
+                <a:spcPts val="7548"/>
+              </a:lnSpc>
+            </a:pPr>
+            <a:r>
+              <a:rPr lang="en-US" sz="5392">
+                <a:solidFill>
+                  <a:srgbClr val="023D54"/>
+                </a:solidFill>
+                <a:latin typeface="Jannah Medium"/>
+                <a:ea typeface="Jannah Medium"/>
+                <a:cs typeface="Jannah Medium"/>
+                <a:sym typeface="Jannah Medium"/>
+              </a:rPr>
+              <a:t>Média de atraso - Chegada</a:t>
+            </a:r>
+          </a:p>
+        </p:txBody>
+      </p:sp>
+      <p:sp>
+        <p:nvSpPr>
+          <p:cNvPr id="32" name="TextBox 32"/>
+          <p:cNvSpPr txBox="1"/>
+          <p:nvPr/>
+        </p:nvSpPr>
+        <p:spPr>
+          <a:xfrm>
+            <a:off x="147766" y="760665"/>
+            <a:ext cx="9029500" cy="481619"/>
+          </a:xfrm>
+          <a:prstGeom prst="rect">
+            <a:avLst/>
+          </a:prstGeom>
+        </p:spPr>
+        <p:txBody>
+          <a:bodyPr lIns="0" tIns="0" rIns="0" bIns="0" rtlCol="0" anchor="t">
+            <a:spAutoFit/>
+          </a:bodyPr>
+          <a:lstStyle/>
+          <a:p>
+            <a:pPr algn="just">
+              <a:lnSpc>
+                <a:spcPts val="3904"/>
+              </a:lnSpc>
+            </a:pPr>
+            <a:r>
+              <a:rPr lang="en-US" sz="2788">
+                <a:solidFill>
+                  <a:srgbClr val="023D54"/>
+                </a:solidFill>
+                <a:latin typeface="Jannah"/>
+                <a:ea typeface="Jannah"/>
+                <a:cs typeface="Jannah"/>
+                <a:sym typeface="Jannah"/>
+              </a:rPr>
+              <a:t>Análise Qualitativa e Quantitativa</a:t>
+            </a:r>
+          </a:p>
+        </p:txBody>
+      </p:sp>
+      <p:sp>
+        <p:nvSpPr>
+          <p:cNvPr id="33" name="TextBox 33"/>
+          <p:cNvSpPr txBox="1"/>
+          <p:nvPr/>
+        </p:nvSpPr>
+        <p:spPr>
+          <a:xfrm>
+            <a:off x="11107522" y="1852229"/>
+            <a:ext cx="6750838" cy="779145"/>
           </a:xfrm>
           <a:prstGeom prst="rect">
             <a:avLst/>
@@ -7746,227 +8744,6 @@
                 <a:cs typeface="Jannah"/>
                 <a:sym typeface="Jannah"/>
               </a:rPr>
-              <a:t>F9, FL, EV, YV, OO, MQ, WN, B6, 9E, B6, UA, US, VX, DL, AA, HA, AS </a:t>
-            </a:r>
-          </a:p>
-          <a:p>
-            <a:pPr algn="l">
-              <a:lnSpc>
-                <a:spcPts val="3120"/>
-              </a:lnSpc>
-            </a:pPr>
-            <a:endParaRPr lang="en-US" sz="2400">
-              <a:solidFill>
-                <a:srgbClr val="545454"/>
-              </a:solidFill>
-              <a:latin typeface="Jannah"/>
-              <a:ea typeface="Jannah"/>
-              <a:cs typeface="Jannah"/>
-              <a:sym typeface="Jannah"/>
-            </a:endParaRPr>
-          </a:p>
-        </p:txBody>
-      </p:sp>
-      <p:sp>
-        <p:nvSpPr>
-          <p:cNvPr id="29" name="TextBox 29"/>
-          <p:cNvSpPr txBox="1"/>
-          <p:nvPr/>
-        </p:nvSpPr>
-        <p:spPr>
-          <a:xfrm>
-            <a:off x="11107522" y="5236100"/>
-            <a:ext cx="1987299" cy="290871"/>
-          </a:xfrm>
-          <a:prstGeom prst="rect">
-            <a:avLst/>
-          </a:prstGeom>
-        </p:spPr>
-        <p:txBody>
-          <a:bodyPr lIns="0" tIns="0" rIns="0" bIns="0" rtlCol="0" anchor="t">
-            <a:spAutoFit/>
-          </a:bodyPr>
-          <a:lstStyle/>
-          <a:p>
-            <a:pPr algn="l">
-              <a:lnSpc>
-                <a:spcPts val="2339"/>
-              </a:lnSpc>
-            </a:pPr>
-            <a:r>
-              <a:rPr lang="en-US" sz="1799">
-                <a:solidFill>
-                  <a:srgbClr val="FFFFFF"/>
-                </a:solidFill>
-                <a:latin typeface="Jannah"/>
-                <a:ea typeface="Jannah"/>
-                <a:cs typeface="Jannah"/>
-                <a:sym typeface="Jannah"/>
-              </a:rPr>
-              <a:t>QUANTAS?</a:t>
-            </a:r>
-          </a:p>
-        </p:txBody>
-      </p:sp>
-      <p:sp>
-        <p:nvSpPr>
-          <p:cNvPr id="30" name="TextBox 30"/>
-          <p:cNvSpPr txBox="1"/>
-          <p:nvPr/>
-        </p:nvSpPr>
-        <p:spPr>
-          <a:xfrm>
-            <a:off x="11107522" y="7149197"/>
-            <a:ext cx="1987299" cy="290871"/>
-          </a:xfrm>
-          <a:prstGeom prst="rect">
-            <a:avLst/>
-          </a:prstGeom>
-        </p:spPr>
-        <p:txBody>
-          <a:bodyPr lIns="0" tIns="0" rIns="0" bIns="0" rtlCol="0" anchor="t">
-            <a:spAutoFit/>
-          </a:bodyPr>
-          <a:lstStyle/>
-          <a:p>
-            <a:pPr algn="l">
-              <a:lnSpc>
-                <a:spcPts val="2339"/>
-              </a:lnSpc>
-            </a:pPr>
-            <a:r>
-              <a:rPr lang="en-US" sz="1799">
-                <a:solidFill>
-                  <a:srgbClr val="FFFFFF"/>
-                </a:solidFill>
-                <a:latin typeface="Jannah"/>
-                <a:ea typeface="Jannah"/>
-                <a:cs typeface="Jannah"/>
-                <a:sym typeface="Jannah"/>
-              </a:rPr>
-              <a:t>QUAIS?</a:t>
-            </a:r>
-          </a:p>
-        </p:txBody>
-      </p:sp>
-      <p:sp>
-        <p:nvSpPr>
-          <p:cNvPr id="31" name="TextBox 31"/>
-          <p:cNvSpPr txBox="1"/>
-          <p:nvPr/>
-        </p:nvSpPr>
-        <p:spPr>
-          <a:xfrm>
-            <a:off x="114500" y="-9312"/>
-            <a:ext cx="9211142" cy="920316"/>
-          </a:xfrm>
-          <a:prstGeom prst="rect">
-            <a:avLst/>
-          </a:prstGeom>
-        </p:spPr>
-        <p:txBody>
-          <a:bodyPr lIns="0" tIns="0" rIns="0" bIns="0" rtlCol="0" anchor="t">
-            <a:spAutoFit/>
-          </a:bodyPr>
-          <a:lstStyle/>
-          <a:p>
-            <a:pPr algn="just">
-              <a:lnSpc>
-                <a:spcPts val="7548"/>
-              </a:lnSpc>
-            </a:pPr>
-            <a:r>
-              <a:rPr lang="en-US" sz="5392">
-                <a:solidFill>
-                  <a:srgbClr val="023D54"/>
-                </a:solidFill>
-                <a:latin typeface="Jannah Medium"/>
-                <a:ea typeface="Jannah Medium"/>
-                <a:cs typeface="Jannah Medium"/>
-                <a:sym typeface="Jannah Medium"/>
-              </a:rPr>
-              <a:t>Média de atraso - Chegada</a:t>
-            </a:r>
-          </a:p>
-        </p:txBody>
-      </p:sp>
-      <p:sp>
-        <p:nvSpPr>
-          <p:cNvPr id="32" name="TextBox 32"/>
-          <p:cNvSpPr txBox="1"/>
-          <p:nvPr/>
-        </p:nvSpPr>
-        <p:spPr>
-          <a:xfrm>
-            <a:off x="147766" y="760665"/>
-            <a:ext cx="9029500" cy="481619"/>
-          </a:xfrm>
-          <a:prstGeom prst="rect">
-            <a:avLst/>
-          </a:prstGeom>
-        </p:spPr>
-        <p:txBody>
-          <a:bodyPr lIns="0" tIns="0" rIns="0" bIns="0" rtlCol="0" anchor="t">
-            <a:spAutoFit/>
-          </a:bodyPr>
-          <a:lstStyle/>
-          <a:p>
-            <a:pPr algn="just">
-              <a:lnSpc>
-                <a:spcPts val="3904"/>
-              </a:lnSpc>
-            </a:pPr>
-            <a:r>
-              <a:rPr lang="en-US" sz="2788">
-                <a:solidFill>
-                  <a:srgbClr val="023D54"/>
-                </a:solidFill>
-                <a:latin typeface="Jannah"/>
-                <a:ea typeface="Jannah"/>
-                <a:cs typeface="Jannah"/>
-                <a:sym typeface="Jannah"/>
-              </a:rPr>
-              <a:t>Análise Qualitativa e Quantitativa</a:t>
-            </a:r>
-          </a:p>
-        </p:txBody>
-      </p:sp>
-      <p:sp>
-        <p:nvSpPr>
-          <p:cNvPr id="33" name="TextBox 33"/>
-          <p:cNvSpPr txBox="1"/>
-          <p:nvPr/>
-        </p:nvSpPr>
-        <p:spPr>
-          <a:xfrm>
-            <a:off x="11107522" y="1852229"/>
-            <a:ext cx="6750838" cy="779145"/>
-          </a:xfrm>
-          <a:prstGeom prst="rect">
-            <a:avLst/>
-          </a:prstGeom>
-        </p:spPr>
-        <p:txBody>
-          <a:bodyPr lIns="0" tIns="0" rIns="0" bIns="0" rtlCol="0" anchor="t">
-            <a:spAutoFit/>
-          </a:bodyPr>
-          <a:lstStyle/>
-          <a:p>
-            <a:pPr algn="l">
-              <a:lnSpc>
-                <a:spcPts val="3120"/>
-              </a:lnSpc>
-            </a:pPr>
-            <a:r>
-              <a:rPr lang="en-US" sz="2400">
-                <a:solidFill>
-                  <a:srgbClr val="545454"/>
-                </a:solidFill>
-                <a:latin typeface="Jannah"/>
-                <a:ea typeface="Jannah"/>
-                <a:cs typeface="Jannah"/>
-                <a:sym typeface="Jannah"/>
-              </a:rPr>
               <a:t>Classificamos em quatro grupos: Antecipado,  Baixo Atraso, Médio Atraso e Alto Atraso.</a:t>
             </a:r>
           </a:p>
@@ -7981,7 +8758,7 @@
         <p:spPr>
           <a:xfrm>
             <a:off x="11107522" y="3774851"/>
-            <a:ext cx="5444760" cy="1254349"/>
+            <a:ext cx="5444760" cy="1270989"/>
           </a:xfrm>
           <a:prstGeom prst="rect">
             <a:avLst/>
@@ -7999,16 +8776,100 @@
               </a:lnSpc>
             </a:pPr>
             <a:r>
-              <a:rPr lang="en-US" sz="1935">
-                <a:solidFill>
-                  <a:srgbClr val="545454"/>
-                </a:solidFill>
-                <a:latin typeface="Jannah"/>
-                <a:ea typeface="Jannah"/>
-                <a:cs typeface="Jannah"/>
-                <a:sym typeface="Jannah"/>
-              </a:rPr>
-              <a:t>Atrasado: Abaixo de 0 minutos;</a:t>
+              <a:rPr lang="en-US" sz="1935" dirty="0" err="1">
+                <a:solidFill>
+                  <a:srgbClr val="545454"/>
+                </a:solidFill>
+                <a:latin typeface="Jannah"/>
+                <a:ea typeface="Jannah"/>
+                <a:cs typeface="Jannah"/>
+                <a:sym typeface="Jannah"/>
+              </a:rPr>
+              <a:t>Chegada</a:t>
+            </a:r>
+            <a:r>
+              <a:rPr lang="en-US" sz="1935" dirty="0">
+                <a:solidFill>
+                  <a:srgbClr val="545454"/>
+                </a:solidFill>
+                <a:latin typeface="Jannah"/>
+                <a:ea typeface="Jannah"/>
+                <a:cs typeface="Jannah"/>
+                <a:sym typeface="Jannah"/>
+              </a:rPr>
+              <a:t> </a:t>
+            </a:r>
+            <a:r>
+              <a:rPr lang="en-US" sz="1935" dirty="0" err="1">
+                <a:solidFill>
+                  <a:srgbClr val="545454"/>
+                </a:solidFill>
+                <a:latin typeface="Jannah"/>
+                <a:ea typeface="Jannah"/>
+                <a:cs typeface="Jannah"/>
+                <a:sym typeface="Jannah"/>
+              </a:rPr>
+              <a:t>Antecipada</a:t>
+            </a:r>
+            <a:r>
+              <a:rPr lang="en-US" sz="1935" dirty="0">
+                <a:solidFill>
+                  <a:srgbClr val="545454"/>
+                </a:solidFill>
+                <a:latin typeface="Jannah"/>
+                <a:ea typeface="Jannah"/>
+                <a:cs typeface="Jannah"/>
+                <a:sym typeface="Jannah"/>
+              </a:rPr>
+              <a:t>: </a:t>
+            </a:r>
+            <a:r>
+              <a:rPr lang="en-US" sz="1935" dirty="0" err="1">
+                <a:solidFill>
+                  <a:srgbClr val="545454"/>
+                </a:solidFill>
+                <a:latin typeface="Jannah"/>
+                <a:ea typeface="Jannah"/>
+                <a:cs typeface="Jannah"/>
+                <a:sym typeface="Jannah"/>
+              </a:rPr>
+              <a:t>Abaixo</a:t>
+            </a:r>
+            <a:r>
+              <a:rPr lang="en-US" sz="1935" dirty="0">
+                <a:solidFill>
+                  <a:srgbClr val="545454"/>
+                </a:solidFill>
+                <a:latin typeface="Jannah"/>
+                <a:ea typeface="Jannah"/>
+                <a:cs typeface="Jannah"/>
+                <a:sym typeface="Jannah"/>
+              </a:rPr>
+              <a:t> de 0 </a:t>
+            </a:r>
+            <a:r>
+              <a:rPr lang="en-US" sz="1935" dirty="0" err="1">
+                <a:solidFill>
+                  <a:srgbClr val="545454"/>
+                </a:solidFill>
+                <a:latin typeface="Jannah"/>
+                <a:ea typeface="Jannah"/>
+                <a:cs typeface="Jannah"/>
+                <a:sym typeface="Jannah"/>
+              </a:rPr>
+              <a:t>minutos</a:t>
+            </a:r>
+            <a:r>
+              <a:rPr lang="en-US" sz="1935" dirty="0">
+                <a:solidFill>
+                  <a:srgbClr val="545454"/>
+                </a:solidFill>
+                <a:latin typeface="Jannah"/>
+                <a:ea typeface="Jannah"/>
+                <a:cs typeface="Jannah"/>
+                <a:sym typeface="Jannah"/>
+              </a:rPr>
+              <a:t>;</a:t>
             </a:r>
           </a:p>
           <a:p>
@@ -8018,16 +8879,76 @@
               </a:lnSpc>
             </a:pPr>
             <a:r>
-              <a:rPr lang="en-US" sz="1935">
-                <a:solidFill>
-                  <a:srgbClr val="545454"/>
-                </a:solidFill>
-                <a:latin typeface="Jannah"/>
-                <a:ea typeface="Jannah"/>
-                <a:cs typeface="Jannah"/>
-                <a:sym typeface="Jannah"/>
-              </a:rPr>
-              <a:t>Baixo Atraso: 0~10 minutos;</a:t>
+              <a:rPr lang="en-US" sz="1935" dirty="0" err="1">
+                <a:solidFill>
+                  <a:srgbClr val="545454"/>
+                </a:solidFill>
+                <a:latin typeface="Jannah"/>
+                <a:ea typeface="Jannah"/>
+                <a:cs typeface="Jannah"/>
+                <a:sym typeface="Jannah"/>
+              </a:rPr>
+              <a:t>Baixo</a:t>
+            </a:r>
+            <a:r>
+              <a:rPr lang="en-US" sz="1935" dirty="0">
+                <a:solidFill>
+                  <a:srgbClr val="545454"/>
+                </a:solidFill>
+                <a:latin typeface="Jannah"/>
+                <a:ea typeface="Jannah"/>
+                <a:cs typeface="Jannah"/>
+                <a:sym typeface="Jannah"/>
+              </a:rPr>
+              <a:t> </a:t>
+            </a:r>
+            <a:r>
+              <a:rPr lang="en-US" sz="1935" dirty="0" err="1">
+                <a:solidFill>
+                  <a:srgbClr val="545454"/>
+                </a:solidFill>
+                <a:latin typeface="Jannah"/>
+                <a:ea typeface="Jannah"/>
+                <a:cs typeface="Jannah"/>
+                <a:sym typeface="Jannah"/>
+              </a:rPr>
+              <a:t>Atraso</a:t>
+            </a:r>
+            <a:r>
+              <a:rPr lang="en-US" sz="1935" dirty="0">
+                <a:solidFill>
+                  <a:srgbClr val="545454"/>
+                </a:solidFill>
+                <a:latin typeface="Jannah"/>
+                <a:ea typeface="Jannah"/>
+                <a:cs typeface="Jannah"/>
+                <a:sym typeface="Jannah"/>
+              </a:rPr>
+              <a:t>: 0~10 </a:t>
+            </a:r>
+            <a:r>
+              <a:rPr lang="en-US" sz="1935" dirty="0" err="1">
+                <a:solidFill>
+                  <a:srgbClr val="545454"/>
+                </a:solidFill>
+                <a:latin typeface="Jannah"/>
+                <a:ea typeface="Jannah"/>
+                <a:cs typeface="Jannah"/>
+                <a:sym typeface="Jannah"/>
+              </a:rPr>
+              <a:t>minutos</a:t>
+            </a:r>
+            <a:r>
+              <a:rPr lang="en-US" sz="1935" dirty="0">
+                <a:solidFill>
+                  <a:srgbClr val="545454"/>
+                </a:solidFill>
+                <a:latin typeface="Jannah"/>
+                <a:ea typeface="Jannah"/>
+                <a:cs typeface="Jannah"/>
+                <a:sym typeface="Jannah"/>
+              </a:rPr>
+              <a:t>;</a:t>
             </a:r>
           </a:p>
           <a:p>
@@ -8037,16 +8958,76 @@
               </a:lnSpc>
             </a:pPr>
             <a:r>
-              <a:rPr lang="en-US" sz="1935">
-                <a:solidFill>
-                  <a:srgbClr val="545454"/>
-                </a:solidFill>
-                <a:latin typeface="Jannah"/>
-                <a:ea typeface="Jannah"/>
-                <a:cs typeface="Jannah"/>
-                <a:sym typeface="Jannah"/>
-              </a:rPr>
-              <a:t>Médio Atraso: 11~15 minutos;</a:t>
+              <a:rPr lang="en-US" sz="1935" dirty="0" err="1">
+                <a:solidFill>
+                  <a:srgbClr val="545454"/>
+                </a:solidFill>
+                <a:latin typeface="Jannah"/>
+                <a:ea typeface="Jannah"/>
+                <a:cs typeface="Jannah"/>
+                <a:sym typeface="Jannah"/>
+              </a:rPr>
+              <a:t>Médio</a:t>
+            </a:r>
+            <a:r>
+              <a:rPr lang="en-US" sz="1935" dirty="0">
+                <a:solidFill>
+                  <a:srgbClr val="545454"/>
+                </a:solidFill>
+                <a:latin typeface="Jannah"/>
+                <a:ea typeface="Jannah"/>
+                <a:cs typeface="Jannah"/>
+                <a:sym typeface="Jannah"/>
+              </a:rPr>
+              <a:t> </a:t>
+            </a:r>
+            <a:r>
+              <a:rPr lang="en-US" sz="1935" dirty="0" err="1">
+                <a:solidFill>
+                  <a:srgbClr val="545454"/>
+                </a:solidFill>
+                <a:latin typeface="Jannah"/>
+                <a:ea typeface="Jannah"/>
+                <a:cs typeface="Jannah"/>
+                <a:sym typeface="Jannah"/>
+              </a:rPr>
+              <a:t>Atraso</a:t>
+            </a:r>
+            <a:r>
+              <a:rPr lang="en-US" sz="1935" dirty="0">
+                <a:solidFill>
+                  <a:srgbClr val="545454"/>
+                </a:solidFill>
+                <a:latin typeface="Jannah"/>
+                <a:ea typeface="Jannah"/>
+                <a:cs typeface="Jannah"/>
+                <a:sym typeface="Jannah"/>
+              </a:rPr>
+              <a:t>: 11~15 </a:t>
+            </a:r>
+            <a:r>
+              <a:rPr lang="en-US" sz="1935" dirty="0" err="1">
+                <a:solidFill>
+                  <a:srgbClr val="545454"/>
+                </a:solidFill>
+                <a:latin typeface="Jannah"/>
+                <a:ea typeface="Jannah"/>
+                <a:cs typeface="Jannah"/>
+                <a:sym typeface="Jannah"/>
+              </a:rPr>
+              <a:t>minutos</a:t>
+            </a:r>
+            <a:r>
+              <a:rPr lang="en-US" sz="1935" dirty="0">
+                <a:solidFill>
+                  <a:srgbClr val="545454"/>
+                </a:solidFill>
+                <a:latin typeface="Jannah"/>
+                <a:ea typeface="Jannah"/>
+                <a:cs typeface="Jannah"/>
+                <a:sym typeface="Jannah"/>
+              </a:rPr>
+              <a:t>;</a:t>
             </a:r>
           </a:p>
           <a:p>
@@ -8056,16 +9037,88 @@
               </a:lnSpc>
             </a:pPr>
             <a:r>
-              <a:rPr lang="en-US" sz="1935">
-                <a:solidFill>
-                  <a:srgbClr val="545454"/>
-                </a:solidFill>
-                <a:latin typeface="Jannah"/>
-                <a:ea typeface="Jannah"/>
-                <a:cs typeface="Jannah"/>
-                <a:sym typeface="Jannah"/>
-              </a:rPr>
-              <a:t>Alto Atraso: A partir de 16 minutos.</a:t>
+              <a:rPr lang="en-US" sz="1935" dirty="0">
+                <a:solidFill>
+                  <a:srgbClr val="545454"/>
+                </a:solidFill>
+                <a:latin typeface="Jannah"/>
+                <a:ea typeface="Jannah"/>
+                <a:cs typeface="Jannah"/>
+                <a:sym typeface="Jannah"/>
+              </a:rPr>
+              <a:t>Alto </a:t>
+            </a:r>
+            <a:r>
+              <a:rPr lang="en-US" sz="1935" dirty="0" err="1">
+                <a:solidFill>
+                  <a:srgbClr val="545454"/>
+                </a:solidFill>
+                <a:latin typeface="Jannah"/>
+                <a:ea typeface="Jannah"/>
+                <a:cs typeface="Jannah"/>
+                <a:sym typeface="Jannah"/>
+              </a:rPr>
+              <a:t>Atraso</a:t>
+            </a:r>
+            <a:r>
+              <a:rPr lang="en-US" sz="1935" dirty="0">
+                <a:solidFill>
+                  <a:srgbClr val="545454"/>
+                </a:solidFill>
+                <a:latin typeface="Jannah"/>
+                <a:ea typeface="Jannah"/>
+                <a:cs typeface="Jannah"/>
+                <a:sym typeface="Jannah"/>
+              </a:rPr>
+              <a:t>: A </a:t>
+            </a:r>
+            <a:r>
+              <a:rPr lang="en-US" sz="1935" dirty="0" err="1">
+                <a:solidFill>
+                  <a:srgbClr val="545454"/>
+                </a:solidFill>
+                <a:latin typeface="Jannah"/>
+                <a:ea typeface="Jannah"/>
+                <a:cs typeface="Jannah"/>
+                <a:sym typeface="Jannah"/>
+              </a:rPr>
+              <a:t>partir</a:t>
+            </a:r>
+            <a:r>
+              <a:rPr lang="en-US" sz="1935" dirty="0">
+                <a:solidFill>
+                  <a:srgbClr val="545454"/>
+                </a:solidFill>
+                <a:latin typeface="Jannah"/>
+                <a:ea typeface="Jannah"/>
+                <a:cs typeface="Jannah"/>
+                <a:sym typeface="Jannah"/>
+              </a:rPr>
+              <a:t> de 16 </a:t>
+            </a:r>
+            <a:r>
+              <a:rPr lang="en-US" sz="1935" dirty="0" err="1">
+                <a:solidFill>
+                  <a:srgbClr val="545454"/>
+                </a:solidFill>
+                <a:latin typeface="Jannah"/>
+                <a:ea typeface="Jannah"/>
+                <a:cs typeface="Jannah"/>
+                <a:sym typeface="Jannah"/>
+              </a:rPr>
+              <a:t>minutos</a:t>
+            </a:r>
+            <a:r>
+              <a:rPr lang="en-US" sz="1935" dirty="0">
+                <a:solidFill>
+                  <a:srgbClr val="545454"/>
+                </a:solidFill>
+                <a:latin typeface="Jannah"/>
+                <a:ea typeface="Jannah"/>
+                <a:cs typeface="Jannah"/>
+                <a:sym typeface="Jannah"/>
+              </a:rPr>
+              <a:t>.</a:t>
             </a:r>
           </a:p>
         </p:txBody>
@@ -8963,7 +10016,7 @@
         <p:spPr>
           <a:xfrm>
             <a:off x="9174546" y="2692865"/>
-            <a:ext cx="8632612" cy="5359399"/>
+            <a:ext cx="8632612" cy="5437514"/>
           </a:xfrm>
           <a:prstGeom prst="rect">
             <a:avLst/>
@@ -9098,7 +10151,7 @@
                 <a:cs typeface="Jannah"/>
                 <a:sym typeface="Jannah"/>
               </a:rPr>
-              <a:t>-se ser </a:t>
+              <a:t> ser </a:t>
             </a:r>
             <a:r>
               <a:rPr lang="en-US" sz="3100" dirty="0" err="1">
@@ -9231,30 +10284,6 @@
                 <a:sym typeface="Jannah"/>
               </a:rPr>
               <a:t>durantes</a:t>
-            </a:r>
-            <a:r>
-              <a:rPr lang="en-US" sz="3100" dirty="0">
-                <a:solidFill>
-                  <a:srgbClr val="545454"/>
-                </a:solidFill>
-                <a:latin typeface="Jannah"/>
-                <a:ea typeface="Jannah"/>
-                <a:cs typeface="Jannah"/>
-                <a:sym typeface="Jannah"/>
-              </a:rPr>
-              <a:t> </a:t>
-            </a:r>
-            <a:r>
-              <a:rPr lang="en-US" sz="3100" dirty="0" err="1">
-                <a:solidFill>
-                  <a:srgbClr val="545454"/>
-                </a:solidFill>
-                <a:latin typeface="Jannah"/>
-                <a:ea typeface="Jannah"/>
-                <a:cs typeface="Jannah"/>
-                <a:sym typeface="Jannah"/>
-              </a:rPr>
-              <a:t>os</a:t>
             </a:r>
             <a:r>
               <a:rPr lang="en-US" sz="3100" dirty="0">

</xml_diff>